<commit_message>
revised the paper when meeting with Shengbo
</commit_message>
<xml_diff>
--- a/Paper/tv_topo/JDSMC/figures/switch_topo.pptx
+++ b/Paper/tv_topo/JDSMC/figures/switch_topo.pptx
@@ -254,7 +254,7 @@
           <a:p>
             <a:fld id="{43204432-33AC-824E-B806-C5C86B28E8E3}" type="datetimeFigureOut">
               <a:rPr lang="en-US" smtClean="0"/>
-              <a:t>2/7/17</a:t>
+              <a:t>2/11/17</a:t>
             </a:fld>
             <a:endParaRPr lang="en-US"/>
           </a:p>
@@ -424,7 +424,7 @@
           <a:p>
             <a:fld id="{43204432-33AC-824E-B806-C5C86B28E8E3}" type="datetimeFigureOut">
               <a:rPr lang="en-US" smtClean="0"/>
-              <a:t>2/7/17</a:t>
+              <a:t>2/11/17</a:t>
             </a:fld>
             <a:endParaRPr lang="en-US"/>
           </a:p>
@@ -604,7 +604,7 @@
           <a:p>
             <a:fld id="{43204432-33AC-824E-B806-C5C86B28E8E3}" type="datetimeFigureOut">
               <a:rPr lang="en-US" smtClean="0"/>
-              <a:t>2/7/17</a:t>
+              <a:t>2/11/17</a:t>
             </a:fld>
             <a:endParaRPr lang="en-US"/>
           </a:p>
@@ -774,7 +774,7 @@
           <a:p>
             <a:fld id="{43204432-33AC-824E-B806-C5C86B28E8E3}" type="datetimeFigureOut">
               <a:rPr lang="en-US" smtClean="0"/>
-              <a:t>2/7/17</a:t>
+              <a:t>2/11/17</a:t>
             </a:fld>
             <a:endParaRPr lang="en-US"/>
           </a:p>
@@ -1020,7 +1020,7 @@
           <a:p>
             <a:fld id="{43204432-33AC-824E-B806-C5C86B28E8E3}" type="datetimeFigureOut">
               <a:rPr lang="en-US" smtClean="0"/>
-              <a:t>2/7/17</a:t>
+              <a:t>2/11/17</a:t>
             </a:fld>
             <a:endParaRPr lang="en-US"/>
           </a:p>
@@ -1252,7 +1252,7 @@
           <a:p>
             <a:fld id="{43204432-33AC-824E-B806-C5C86B28E8E3}" type="datetimeFigureOut">
               <a:rPr lang="en-US" smtClean="0"/>
-              <a:t>2/7/17</a:t>
+              <a:t>2/11/17</a:t>
             </a:fld>
             <a:endParaRPr lang="en-US"/>
           </a:p>
@@ -1619,7 +1619,7 @@
           <a:p>
             <a:fld id="{43204432-33AC-824E-B806-C5C86B28E8E3}" type="datetimeFigureOut">
               <a:rPr lang="en-US" smtClean="0"/>
-              <a:t>2/7/17</a:t>
+              <a:t>2/11/17</a:t>
             </a:fld>
             <a:endParaRPr lang="en-US"/>
           </a:p>
@@ -1737,7 +1737,7 @@
           <a:p>
             <a:fld id="{43204432-33AC-824E-B806-C5C86B28E8E3}" type="datetimeFigureOut">
               <a:rPr lang="en-US" smtClean="0"/>
-              <a:t>2/7/17</a:t>
+              <a:t>2/11/17</a:t>
             </a:fld>
             <a:endParaRPr lang="en-US"/>
           </a:p>
@@ -1832,7 +1832,7 @@
           <a:p>
             <a:fld id="{43204432-33AC-824E-B806-C5C86B28E8E3}" type="datetimeFigureOut">
               <a:rPr lang="en-US" smtClean="0"/>
-              <a:t>2/7/17</a:t>
+              <a:t>2/11/17</a:t>
             </a:fld>
             <a:endParaRPr lang="en-US"/>
           </a:p>
@@ -2109,7 +2109,7 @@
           <a:p>
             <a:fld id="{43204432-33AC-824E-B806-C5C86B28E8E3}" type="datetimeFigureOut">
               <a:rPr lang="en-US" smtClean="0"/>
-              <a:t>2/7/17</a:t>
+              <a:t>2/11/17</a:t>
             </a:fld>
             <a:endParaRPr lang="en-US"/>
           </a:p>
@@ -2362,7 +2362,7 @@
           <a:p>
             <a:fld id="{43204432-33AC-824E-B806-C5C86B28E8E3}" type="datetimeFigureOut">
               <a:rPr lang="en-US" smtClean="0"/>
-              <a:t>2/7/17</a:t>
+              <a:t>2/11/17</a:t>
             </a:fld>
             <a:endParaRPr lang="en-US"/>
           </a:p>
@@ -2575,7 +2575,7 @@
           <a:p>
             <a:fld id="{43204432-33AC-824E-B806-C5C86B28E8E3}" type="datetimeFigureOut">
               <a:rPr lang="en-US" smtClean="0"/>
-              <a:t>2/7/17</a:t>
+              <a:t>2/11/17</a:t>
             </a:fld>
             <a:endParaRPr lang="en-US"/>
           </a:p>
@@ -4281,7 +4281,7 @@
         </p:nvSpPr>
         <p:spPr>
           <a:xfrm>
-            <a:off x="9803668" y="1492789"/>
+            <a:off x="9887640" y="1923564"/>
             <a:ext cx="240030" cy="240030"/>
           </a:xfrm>
           <a:prstGeom prst="ellipse">
@@ -4321,7 +4321,7 @@
         </p:nvSpPr>
         <p:spPr>
           <a:xfrm>
-            <a:off x="8633479" y="2270722"/>
+            <a:off x="8717451" y="2701497"/>
             <a:ext cx="240030" cy="240030"/>
           </a:xfrm>
           <a:prstGeom prst="ellipse">
@@ -4361,7 +4361,7 @@
         </p:nvSpPr>
         <p:spPr>
           <a:xfrm>
-            <a:off x="9803668" y="3046057"/>
+            <a:off x="9887640" y="3476832"/>
             <a:ext cx="240030" cy="240030"/>
           </a:xfrm>
           <a:prstGeom prst="ellipse">
@@ -4401,7 +4401,7 @@
         </p:nvSpPr>
         <p:spPr>
           <a:xfrm>
-            <a:off x="10959928" y="3058408"/>
+            <a:off x="11043900" y="3489183"/>
             <a:ext cx="240030" cy="240030"/>
           </a:xfrm>
           <a:prstGeom prst="ellipse">
@@ -4441,7 +4441,7 @@
         </p:nvSpPr>
         <p:spPr>
           <a:xfrm>
-            <a:off x="11802631" y="2283073"/>
+            <a:off x="11886603" y="2713848"/>
             <a:ext cx="240030" cy="240030"/>
           </a:xfrm>
           <a:prstGeom prst="ellipse">
@@ -4481,7 +4481,7 @@
         </p:nvSpPr>
         <p:spPr>
           <a:xfrm>
-            <a:off x="10959928" y="1507738"/>
+            <a:off x="11043900" y="1938513"/>
             <a:ext cx="240030" cy="240030"/>
           </a:xfrm>
           <a:prstGeom prst="ellipse">
@@ -4521,7 +4521,7 @@
         </p:nvCxnSpPr>
         <p:spPr>
           <a:xfrm flipH="1">
-            <a:off x="10236070" y="1850472"/>
+            <a:off x="10320042" y="2281247"/>
             <a:ext cx="723858" cy="1195585"/>
           </a:xfrm>
           <a:prstGeom prst="straightConnector1">
@@ -4678,7 +4678,7 @@
         </p:nvCxnSpPr>
         <p:spPr>
           <a:xfrm flipV="1">
-            <a:off x="11273485" y="2555706"/>
+            <a:off x="11357457" y="2986481"/>
             <a:ext cx="602673" cy="522954"/>
           </a:xfrm>
           <a:prstGeom prst="straightConnector1">
@@ -4715,7 +4715,7 @@
         </p:nvCxnSpPr>
         <p:spPr>
           <a:xfrm>
-            <a:off x="10214042" y="1630387"/>
+            <a:off x="10298014" y="2061162"/>
             <a:ext cx="604091" cy="0"/>
           </a:xfrm>
           <a:prstGeom prst="straightConnector1">
@@ -4752,7 +4752,7 @@
         </p:nvCxnSpPr>
         <p:spPr>
           <a:xfrm>
-            <a:off x="10214042" y="3201910"/>
+            <a:off x="10298014" y="3632685"/>
             <a:ext cx="604091" cy="5508"/>
           </a:xfrm>
           <a:prstGeom prst="straightConnector1">
@@ -4789,7 +4789,7 @@
         </p:nvCxnSpPr>
         <p:spPr>
           <a:xfrm flipH="1">
-            <a:off x="10251660" y="2534281"/>
+            <a:off x="10335632" y="2965056"/>
             <a:ext cx="1449218" cy="578800"/>
           </a:xfrm>
           <a:prstGeom prst="straightConnector1">
@@ -4826,7 +4826,7 @@
         </p:nvSpPr>
         <p:spPr>
           <a:xfrm>
-            <a:off x="10214042" y="3497261"/>
+            <a:off x="10298014" y="3928036"/>
             <a:ext cx="551754" cy="492443"/>
           </a:xfrm>
           <a:prstGeom prst="rect">
@@ -5625,36 +5625,6 @@
           </a:graphicData>
         </a:graphic>
       </p:graphicFrame>
-      <p:sp>
-        <p:nvSpPr>
-          <p:cNvPr id="69" name="TextBox 68"/>
-          <p:cNvSpPr txBox="1"/>
-          <p:nvPr/>
-        </p:nvSpPr>
-        <p:spPr>
-          <a:xfrm>
-            <a:off x="5236150" y="6376626"/>
-            <a:ext cx="492314" cy="492443"/>
-          </a:xfrm>
-          <a:prstGeom prst="rect">
-            <a:avLst/>
-          </a:prstGeom>
-          <a:noFill/>
-        </p:spPr>
-        <p:txBody>
-          <a:bodyPr wrap="none" rtlCol="0">
-            <a:spAutoFit/>
-          </a:bodyPr>
-          <a:lstStyle/>
-          <a:p>
-            <a:r>
-              <a:rPr lang="en-US" sz="2600" dirty="0" smtClean="0"/>
-              <a:t>(f)</a:t>
-            </a:r>
-            <a:endParaRPr lang="en-US" sz="2600" dirty="0"/>
-          </a:p>
-        </p:txBody>
-      </p:sp>
       <p:cxnSp>
         <p:nvCxnSpPr>
           <p:cNvPr id="60" name="Straight Arrow Connector 59"/>
@@ -5663,7 +5633,7 @@
         </p:nvCxnSpPr>
         <p:spPr>
           <a:xfrm flipV="1">
-            <a:off x="9020554" y="1671999"/>
+            <a:off x="9104526" y="2102774"/>
             <a:ext cx="575152" cy="522494"/>
           </a:xfrm>
           <a:prstGeom prst="straightConnector1">
@@ -5700,7 +5670,7 @@
         </p:nvCxnSpPr>
         <p:spPr>
           <a:xfrm flipH="1">
-            <a:off x="9121999" y="1841275"/>
+            <a:off x="9205971" y="2272050"/>
             <a:ext cx="610475" cy="541162"/>
           </a:xfrm>
           <a:prstGeom prst="straightConnector1">
@@ -5737,7 +5707,7 @@
         </p:nvCxnSpPr>
         <p:spPr>
           <a:xfrm flipH="1" flipV="1">
-            <a:off x="9091058" y="2477694"/>
+            <a:off x="9175030" y="2908469"/>
             <a:ext cx="662349" cy="503386"/>
           </a:xfrm>
           <a:prstGeom prst="straightConnector1">
@@ -5774,7 +5744,7 @@
         </p:nvCxnSpPr>
         <p:spPr>
           <a:xfrm>
-            <a:off x="8954224" y="2696582"/>
+            <a:off x="9038196" y="3127357"/>
             <a:ext cx="693607" cy="510780"/>
           </a:xfrm>
           <a:prstGeom prst="straightConnector1">
@@ -5803,6 +5773,214 @@
           </a:fontRef>
         </p:style>
       </p:cxnSp>
+      <p:cxnSp>
+        <p:nvCxnSpPr>
+          <p:cNvPr id="49" name="Straight Connector 48"/>
+          <p:cNvCxnSpPr>
+            <a:stCxn id="68" idx="2"/>
+            <a:endCxn id="57" idx="2"/>
+          </p:cNvCxnSpPr>
+          <p:nvPr/>
+        </p:nvCxnSpPr>
+        <p:spPr>
+          <a:xfrm>
+            <a:off x="98816" y="2813212"/>
+            <a:ext cx="7993888" cy="0"/>
+          </a:xfrm>
+          <a:prstGeom prst="line">
+            <a:avLst/>
+          </a:prstGeom>
+          <a:ln w="25400">
+            <a:prstDash val="sysDot"/>
+          </a:ln>
+        </p:spPr>
+        <p:style>
+          <a:lnRef idx="1">
+            <a:schemeClr val="dk1"/>
+          </a:lnRef>
+          <a:fillRef idx="0">
+            <a:schemeClr val="dk1"/>
+          </a:fillRef>
+          <a:effectRef idx="0">
+            <a:schemeClr val="dk1"/>
+          </a:effectRef>
+          <a:fontRef idx="minor">
+            <a:schemeClr val="tx1"/>
+          </a:fontRef>
+        </p:style>
+      </p:cxnSp>
+      <p:cxnSp>
+        <p:nvCxnSpPr>
+          <p:cNvPr id="52" name="Straight Connector 51"/>
+          <p:cNvCxnSpPr/>
+          <p:nvPr/>
+        </p:nvCxnSpPr>
+        <p:spPr>
+          <a:xfrm>
+            <a:off x="4087091" y="125779"/>
+            <a:ext cx="0" cy="5374866"/>
+          </a:xfrm>
+          <a:prstGeom prst="line">
+            <a:avLst/>
+          </a:prstGeom>
+          <a:ln w="25400">
+            <a:solidFill>
+              <a:schemeClr val="tx1"/>
+            </a:solidFill>
+            <a:prstDash val="sysDot"/>
+          </a:ln>
+        </p:spPr>
+        <p:style>
+          <a:lnRef idx="1">
+            <a:schemeClr val="accent1"/>
+          </a:lnRef>
+          <a:fillRef idx="0">
+            <a:schemeClr val="accent1"/>
+          </a:fillRef>
+          <a:effectRef idx="0">
+            <a:schemeClr val="accent1"/>
+          </a:effectRef>
+          <a:fontRef idx="minor">
+            <a:schemeClr val="tx1"/>
+          </a:fontRef>
+        </p:style>
+      </p:cxnSp>
+      <p:sp>
+        <p:nvSpPr>
+          <p:cNvPr id="57" name="Right Bracket 56"/>
+          <p:cNvSpPr/>
+          <p:nvPr/>
+        </p:nvSpPr>
+        <p:spPr>
+          <a:xfrm>
+            <a:off x="7729830" y="125779"/>
+            <a:ext cx="362874" cy="5374866"/>
+          </a:xfrm>
+          <a:prstGeom prst="rightBracket">
+            <a:avLst/>
+          </a:prstGeom>
+          <a:ln w="25400">
+            <a:solidFill>
+              <a:schemeClr val="tx1"/>
+            </a:solidFill>
+            <a:prstDash val="dash"/>
+          </a:ln>
+        </p:spPr>
+        <p:style>
+          <a:lnRef idx="1">
+            <a:schemeClr val="accent1"/>
+          </a:lnRef>
+          <a:fillRef idx="0">
+            <a:schemeClr val="accent1"/>
+          </a:fillRef>
+          <a:effectRef idx="0">
+            <a:schemeClr val="accent1"/>
+          </a:effectRef>
+          <a:fontRef idx="minor">
+            <a:schemeClr val="tx1"/>
+          </a:fontRef>
+        </p:style>
+        <p:txBody>
+          <a:bodyPr rtlCol="0" anchor="ctr"/>
+          <a:lstStyle/>
+          <a:p>
+            <a:pPr algn="ctr"/>
+            <a:endParaRPr lang="en-US"/>
+          </a:p>
+        </p:txBody>
+      </p:sp>
+      <p:sp>
+        <p:nvSpPr>
+          <p:cNvPr id="68" name="Right Bracket 67"/>
+          <p:cNvSpPr/>
+          <p:nvPr/>
+        </p:nvSpPr>
+        <p:spPr>
+          <a:xfrm flipH="1">
+            <a:off x="98816" y="125779"/>
+            <a:ext cx="362874" cy="5374866"/>
+          </a:xfrm>
+          <a:prstGeom prst="rightBracket">
+            <a:avLst/>
+          </a:prstGeom>
+          <a:ln w="25400">
+            <a:solidFill>
+              <a:schemeClr val="tx1"/>
+            </a:solidFill>
+            <a:prstDash val="dash"/>
+          </a:ln>
+        </p:spPr>
+        <p:style>
+          <a:lnRef idx="1">
+            <a:schemeClr val="accent1"/>
+          </a:lnRef>
+          <a:fillRef idx="0">
+            <a:schemeClr val="accent1"/>
+          </a:fillRef>
+          <a:effectRef idx="0">
+            <a:schemeClr val="accent1"/>
+          </a:effectRef>
+          <a:fontRef idx="minor">
+            <a:schemeClr val="tx1"/>
+          </a:fontRef>
+        </p:style>
+        <p:txBody>
+          <a:bodyPr rtlCol="0" anchor="ctr"/>
+          <a:lstStyle/>
+          <a:p>
+            <a:pPr algn="ctr"/>
+            <a:endParaRPr lang="en-US"/>
+          </a:p>
+        </p:txBody>
+      </p:sp>
+      <p:sp>
+        <p:nvSpPr>
+          <p:cNvPr id="73" name="Right Arrow 72"/>
+          <p:cNvSpPr/>
+          <p:nvPr/>
+        </p:nvSpPr>
+        <p:spPr>
+          <a:xfrm rot="1754557">
+            <a:off x="8367240" y="1616433"/>
+            <a:ext cx="819700" cy="291761"/>
+          </a:xfrm>
+          <a:prstGeom prst="rightArrow">
+            <a:avLst/>
+          </a:prstGeom>
+          <a:solidFill>
+            <a:schemeClr val="tx1"/>
+          </a:solidFill>
+          <a:ln>
+            <a:solidFill>
+              <a:schemeClr val="tx1"/>
+            </a:solidFill>
+          </a:ln>
+        </p:spPr>
+        <p:style>
+          <a:lnRef idx="2">
+            <a:schemeClr val="accent1">
+              <a:shade val="50000"/>
+            </a:schemeClr>
+          </a:lnRef>
+          <a:fillRef idx="1">
+            <a:schemeClr val="accent1"/>
+          </a:fillRef>
+          <a:effectRef idx="0">
+            <a:schemeClr val="accent1"/>
+          </a:effectRef>
+          <a:fontRef idx="minor">
+            <a:schemeClr val="lt1"/>
+          </a:fontRef>
+        </p:style>
+        <p:txBody>
+          <a:bodyPr rtlCol="0" anchor="ctr"/>
+          <a:lstStyle/>
+          <a:p>
+            <a:pPr algn="ctr"/>
+            <a:endParaRPr lang="en-US"/>
+          </a:p>
+        </p:txBody>
+      </p:sp>
     </p:spTree>
     <p:extLst>
       <p:ext uri="{BB962C8B-B14F-4D97-AF65-F5344CB8AC3E}">

</xml_diff>